<commit_message>
few changes here and there. cleaned up a lot!
</commit_message>
<xml_diff>
--- a/documentation/Data centres - all things used as inputs.pptx
+++ b/documentation/Data centres - all things used as inputs.pptx
@@ -25,6 +25,7 @@
     <p:sldId id="273" r:id="rId19"/>
     <p:sldId id="274" r:id="rId20"/>
     <p:sldId id="275" r:id="rId21"/>
+    <p:sldId id="276" r:id="rId22"/>
   </p:sldIdLst>
   <p:sldSz cx="12192000" cy="6858000"/>
   <p:notesSz cx="6858000" cy="9144000"/>
@@ -278,7 +279,7 @@
           <a:p>
             <a:fld id="{BB61594E-0383-42A7-8AE6-F7EB3EDFC0B3}" type="datetimeFigureOut">
               <a:rPr lang="en-US" smtClean="0"/>
-              <a:t>11/11/2024</a:t>
+              <a:t>11/12/2024</a:t>
             </a:fld>
             <a:endParaRPr lang="en-US"/>
           </a:p>
@@ -476,7 +477,7 @@
           <a:p>
             <a:fld id="{BB61594E-0383-42A7-8AE6-F7EB3EDFC0B3}" type="datetimeFigureOut">
               <a:rPr lang="en-US" smtClean="0"/>
-              <a:t>11/11/2024</a:t>
+              <a:t>11/12/2024</a:t>
             </a:fld>
             <a:endParaRPr lang="en-US"/>
           </a:p>
@@ -684,7 +685,7 @@
           <a:p>
             <a:fld id="{BB61594E-0383-42A7-8AE6-F7EB3EDFC0B3}" type="datetimeFigureOut">
               <a:rPr lang="en-US" smtClean="0"/>
-              <a:t>11/11/2024</a:t>
+              <a:t>11/12/2024</a:t>
             </a:fld>
             <a:endParaRPr lang="en-US"/>
           </a:p>
@@ -882,7 +883,7 @@
           <a:p>
             <a:fld id="{BB61594E-0383-42A7-8AE6-F7EB3EDFC0B3}" type="datetimeFigureOut">
               <a:rPr lang="en-US" smtClean="0"/>
-              <a:t>11/11/2024</a:t>
+              <a:t>11/12/2024</a:t>
             </a:fld>
             <a:endParaRPr lang="en-US"/>
           </a:p>
@@ -1157,7 +1158,7 @@
           <a:p>
             <a:fld id="{BB61594E-0383-42A7-8AE6-F7EB3EDFC0B3}" type="datetimeFigureOut">
               <a:rPr lang="en-US" smtClean="0"/>
-              <a:t>11/11/2024</a:t>
+              <a:t>11/12/2024</a:t>
             </a:fld>
             <a:endParaRPr lang="en-US"/>
           </a:p>
@@ -1422,7 +1423,7 @@
           <a:p>
             <a:fld id="{BB61594E-0383-42A7-8AE6-F7EB3EDFC0B3}" type="datetimeFigureOut">
               <a:rPr lang="en-US" smtClean="0"/>
-              <a:t>11/11/2024</a:t>
+              <a:t>11/12/2024</a:t>
             </a:fld>
             <a:endParaRPr lang="en-US"/>
           </a:p>
@@ -1834,7 +1835,7 @@
           <a:p>
             <a:fld id="{BB61594E-0383-42A7-8AE6-F7EB3EDFC0B3}" type="datetimeFigureOut">
               <a:rPr lang="en-US" smtClean="0"/>
-              <a:t>11/11/2024</a:t>
+              <a:t>11/12/2024</a:t>
             </a:fld>
             <a:endParaRPr lang="en-US"/>
           </a:p>
@@ -1975,7 +1976,7 @@
           <a:p>
             <a:fld id="{BB61594E-0383-42A7-8AE6-F7EB3EDFC0B3}" type="datetimeFigureOut">
               <a:rPr lang="en-US" smtClean="0"/>
-              <a:t>11/11/2024</a:t>
+              <a:t>11/12/2024</a:t>
             </a:fld>
             <a:endParaRPr lang="en-US"/>
           </a:p>
@@ -2088,7 +2089,7 @@
           <a:p>
             <a:fld id="{BB61594E-0383-42A7-8AE6-F7EB3EDFC0B3}" type="datetimeFigureOut">
               <a:rPr lang="en-US" smtClean="0"/>
-              <a:t>11/11/2024</a:t>
+              <a:t>11/12/2024</a:t>
             </a:fld>
             <a:endParaRPr lang="en-US"/>
           </a:p>
@@ -2399,7 +2400,7 @@
           <a:p>
             <a:fld id="{BB61594E-0383-42A7-8AE6-F7EB3EDFC0B3}" type="datetimeFigureOut">
               <a:rPr lang="en-US" smtClean="0"/>
-              <a:t>11/11/2024</a:t>
+              <a:t>11/12/2024</a:t>
             </a:fld>
             <a:endParaRPr lang="en-US"/>
           </a:p>
@@ -2687,7 +2688,7 @@
           <a:p>
             <a:fld id="{BB61594E-0383-42A7-8AE6-F7EB3EDFC0B3}" type="datetimeFigureOut">
               <a:rPr lang="en-US" smtClean="0"/>
-              <a:t>11/11/2024</a:t>
+              <a:t>11/12/2024</a:t>
             </a:fld>
             <a:endParaRPr lang="en-US"/>
           </a:p>
@@ -2928,7 +2929,7 @@
           <a:p>
             <a:fld id="{BB61594E-0383-42A7-8AE6-F7EB3EDFC0B3}" type="datetimeFigureOut">
               <a:rPr lang="en-US" smtClean="0"/>
-              <a:t>11/11/2024</a:t>
+              <a:t>11/12/2024</a:t>
             </a:fld>
             <a:endParaRPr lang="en-US"/>
           </a:p>
@@ -3399,7 +3400,18 @@
           <a:bodyPr/>
           <a:lstStyle/>
           <a:p>
-            <a:endParaRPr lang="en-US"/>
+            <a:r>
+              <a:rPr lang="en-US" dirty="0"/>
+              <a:t>This file contains snippets of graphs and things I found interesting or useful in crafting the projections of growth rates, new capacity, intensity, ai/data-</a:t>
+            </a:r>
+            <a:r>
+              <a:rPr lang="en-US" dirty="0" err="1"/>
+              <a:t>centre</a:t>
+            </a:r>
+            <a:r>
+              <a:rPr lang="en-US" dirty="0"/>
+              <a:t> capacity ratios and so on.</a:t>
+            </a:r>
           </a:p>
         </p:txBody>
       </p:sp>
@@ -3454,7 +3466,11 @@
           <a:bodyPr/>
           <a:lstStyle/>
           <a:p>
-            <a:endParaRPr lang="en-US"/>
+            <a:r>
+              <a:rPr lang="en-US" dirty="0" err="1"/>
+              <a:t>iea</a:t>
+            </a:r>
+            <a:endParaRPr lang="en-US" dirty="0"/>
           </a:p>
         </p:txBody>
       </p:sp>
@@ -3505,7 +3521,7 @@
         </p:blipFill>
         <p:spPr>
           <a:xfrm>
-            <a:off x="2395021" y="251969"/>
+            <a:off x="1796306" y="1318769"/>
             <a:ext cx="7401958" cy="6354062"/>
           </a:xfrm>
           <a:prstGeom prst="rect">
@@ -5035,6 +5051,200 @@
 </p:sld>
 </file>
 
+<file path=ppt/slides/slide21.xml><?xml version="1.0" encoding="utf-8"?>
+<p:sld xmlns:a="http://schemas.openxmlformats.org/drawingml/2006/main" xmlns:r="http://schemas.openxmlformats.org/officeDocument/2006/relationships" xmlns:p="http://schemas.openxmlformats.org/presentationml/2006/main">
+  <p:cSld>
+    <p:spTree>
+      <p:nvGrpSpPr>
+        <p:cNvPr id="1" name=""/>
+        <p:cNvGrpSpPr/>
+        <p:nvPr/>
+      </p:nvGrpSpPr>
+      <p:grpSpPr>
+        <a:xfrm>
+          <a:off x="0" y="0"/>
+          <a:ext cx="0" cy="0"/>
+          <a:chOff x="0" y="0"/>
+          <a:chExt cx="0" cy="0"/>
+        </a:xfrm>
+      </p:grpSpPr>
+      <p:sp>
+        <p:nvSpPr>
+          <p:cNvPr id="2" name="Title 1">
+            <a:extLst>
+              <a:ext uri="{FF2B5EF4-FFF2-40B4-BE49-F238E27FC236}">
+                <a16:creationId xmlns:a16="http://schemas.microsoft.com/office/drawing/2014/main" id="{073384F4-20E7-69AC-4B18-F347483E1FA0}"/>
+              </a:ext>
+            </a:extLst>
+          </p:cNvPr>
+          <p:cNvSpPr>
+            <a:spLocks noGrp="1"/>
+          </p:cNvSpPr>
+          <p:nvPr>
+            <p:ph type="title"/>
+          </p:nvPr>
+        </p:nvSpPr>
+        <p:spPr/>
+        <p:txBody>
+          <a:bodyPr/>
+          <a:lstStyle/>
+          <a:p>
+            <a:endParaRPr lang="en-US"/>
+          </a:p>
+        </p:txBody>
+      </p:sp>
+      <p:sp>
+        <p:nvSpPr>
+          <p:cNvPr id="3" name="Content Placeholder 2">
+            <a:extLst>
+              <a:ext uri="{FF2B5EF4-FFF2-40B4-BE49-F238E27FC236}">
+                <a16:creationId xmlns:a16="http://schemas.microsoft.com/office/drawing/2014/main" id="{8C90DDC6-52BB-E5DC-A921-0F9EEA107553}"/>
+              </a:ext>
+            </a:extLst>
+          </p:cNvPr>
+          <p:cNvSpPr>
+            <a:spLocks noGrp="1"/>
+          </p:cNvSpPr>
+          <p:nvPr>
+            <p:ph idx="1"/>
+          </p:nvPr>
+        </p:nvSpPr>
+        <p:spPr>
+          <a:xfrm>
+            <a:off x="8982074" y="547308"/>
+            <a:ext cx="2867025" cy="5676901"/>
+          </a:xfrm>
+        </p:spPr>
+        <p:txBody>
+          <a:bodyPr>
+            <a:normAutofit fontScale="70000" lnSpcReduction="20000"/>
+          </a:bodyPr>
+          <a:lstStyle/>
+          <a:p>
+            <a:r>
+              <a:rPr lang="en-US" dirty="0"/>
+              <a:t>Hi, just as a first </a:t>
+            </a:r>
+            <a:r>
+              <a:rPr lang="en-US" dirty="0" err="1"/>
+              <a:t>estiamte</a:t>
+            </a:r>
+            <a:r>
+              <a:rPr lang="en-US" dirty="0"/>
+              <a:t> to help understand the general trajectory of </a:t>
+            </a:r>
+            <a:r>
+              <a:rPr lang="en-US" dirty="0" err="1"/>
+              <a:t>aperc</a:t>
+            </a:r>
+            <a:r>
+              <a:rPr lang="en-US" dirty="0"/>
+              <a:t> total data </a:t>
+            </a:r>
+            <a:r>
+              <a:rPr lang="en-US" dirty="0" err="1"/>
+              <a:t>centres</a:t>
+            </a:r>
+            <a:r>
+              <a:rPr lang="en-US" dirty="0"/>
+              <a:t> demand </a:t>
+            </a:r>
+            <a:r>
+              <a:rPr lang="en-US" dirty="0" err="1"/>
+              <a:t>i</a:t>
+            </a:r>
+            <a:r>
+              <a:rPr lang="en-US" dirty="0"/>
+              <a:t> have done USA's projection using this G-Sachs report from May this year:</a:t>
+            </a:r>
+          </a:p>
+          <a:p>
+            <a:endParaRPr lang="en-US" dirty="0"/>
+          </a:p>
+          <a:p>
+            <a:r>
+              <a:rPr lang="en-US" dirty="0">
+                <a:hlinkClick r:id="rId2"/>
+              </a:rPr>
+              <a:t>https://www.goldmansachs.com/pdfs/insights/pages/generational-growth-ai-data-centers-and-the-coming-us-power-surge/report.pdf</a:t>
+            </a:r>
+            <a:endParaRPr lang="en-US" dirty="0"/>
+          </a:p>
+          <a:p>
+            <a:r>
+              <a:rPr lang="en-US" dirty="0"/>
+              <a:t>Note 1050 </a:t>
+            </a:r>
+            <a:r>
+              <a:rPr lang="en-US" dirty="0" err="1"/>
+              <a:t>twh</a:t>
+            </a:r>
+            <a:r>
+              <a:rPr lang="en-US" dirty="0"/>
+              <a:t> is 3780pj, 200 </a:t>
+            </a:r>
+            <a:r>
+              <a:rPr lang="en-US" dirty="0" err="1"/>
+              <a:t>twh</a:t>
+            </a:r>
+            <a:r>
+              <a:rPr lang="en-US" dirty="0"/>
+              <a:t> is 720pj , 850 </a:t>
+            </a:r>
+            <a:r>
+              <a:rPr lang="en-US" dirty="0" err="1"/>
+              <a:t>twh</a:t>
+            </a:r>
+            <a:r>
+              <a:rPr lang="en-US" dirty="0"/>
+              <a:t> is 3060pj </a:t>
+            </a:r>
+          </a:p>
+        </p:txBody>
+      </p:sp>
+      <p:pic>
+        <p:nvPicPr>
+          <p:cNvPr id="5" name="Picture 4">
+            <a:extLst>
+              <a:ext uri="{FF2B5EF4-FFF2-40B4-BE49-F238E27FC236}">
+                <a16:creationId xmlns:a16="http://schemas.microsoft.com/office/drawing/2014/main" id="{99D67208-9983-496F-E2DC-C680E1B48FC5}"/>
+              </a:ext>
+            </a:extLst>
+          </p:cNvPr>
+          <p:cNvPicPr>
+            <a:picLocks noChangeAspect="1"/>
+          </p:cNvPicPr>
+          <p:nvPr/>
+        </p:nvPicPr>
+        <p:blipFill>
+          <a:blip r:embed="rId3"/>
+          <a:stretch>
+            <a:fillRect/>
+          </a:stretch>
+        </p:blipFill>
+        <p:spPr>
+          <a:xfrm>
+            <a:off x="123264" y="547308"/>
+            <a:ext cx="8040222" cy="5439534"/>
+          </a:xfrm>
+          <a:prstGeom prst="rect">
+            <a:avLst/>
+          </a:prstGeom>
+        </p:spPr>
+      </p:pic>
+    </p:spTree>
+    <p:extLst>
+      <p:ext uri="{BB962C8B-B14F-4D97-AF65-F5344CB8AC3E}">
+        <p14:creationId xmlns:p14="http://schemas.microsoft.com/office/powerpoint/2010/main" val="3081745089"/>
+      </p:ext>
+    </p:extLst>
+  </p:cSld>
+  <p:clrMapOvr>
+    <a:masterClrMapping/>
+  </p:clrMapOvr>
+</p:sld>
+</file>
+
 <file path=ppt/slides/slide3.xml><?xml version="1.0" encoding="utf-8"?>
 <p:sld xmlns:a="http://schemas.openxmlformats.org/drawingml/2006/main" xmlns:r="http://schemas.openxmlformats.org/officeDocument/2006/relationships" xmlns:p="http://schemas.openxmlformats.org/presentationml/2006/main">
   <p:cSld>
@@ -5073,7 +5283,27 @@
           <a:bodyPr/>
           <a:lstStyle/>
           <a:p>
-            <a:endParaRPr lang="en-US"/>
+            <a:r>
+              <a:rPr lang="en-US" dirty="0" err="1"/>
+              <a:t>Iea</a:t>
+            </a:r>
+            <a:r>
+              <a:rPr lang="en-US" dirty="0"/>
+              <a:t> – think its found by searching up ‘</a:t>
+            </a:r>
+            <a:r>
+              <a:rPr lang="en-US" dirty="0" err="1"/>
+              <a:t>iea</a:t>
+            </a:r>
+            <a:r>
+              <a:rPr lang="en-US" dirty="0"/>
+              <a:t> </a:t>
+            </a:r>
+            <a:r>
+              <a:rPr lang="en-US" dirty="0" err="1"/>
+              <a:t>datacentres’</a:t>
+            </a:r>
+            <a:endParaRPr lang="en-US" dirty="0"/>
           </a:p>
         </p:txBody>
       </p:sp>
@@ -5243,7 +5473,14 @@
           <a:bodyPr/>
           <a:lstStyle/>
           <a:p>
-            <a:endParaRPr lang="en-US"/>
+            <a:r>
+              <a:rPr lang="en-US" dirty="0" err="1"/>
+              <a:t>Iea</a:t>
+            </a:r>
+            <a:r>
+              <a:rPr lang="en-US" dirty="0"/>
+              <a:t> cont.</a:t>
+            </a:r>
           </a:p>
         </p:txBody>
       </p:sp>
@@ -5702,7 +5939,7 @@
           <a:p>
             <a:r>
               <a:rPr lang="en-US" dirty="0"/>
-              <a:t>Important topics</a:t>
+              <a:t>Important topics we could mention in discussion</a:t>
             </a:r>
           </a:p>
         </p:txBody>
@@ -5826,7 +6063,22 @@
           <a:bodyPr/>
           <a:lstStyle/>
           <a:p>
-            <a:endParaRPr lang="en-US"/>
+            <a:r>
+              <a:rPr lang="en-US" dirty="0" err="1"/>
+              <a:t>Nz</a:t>
+            </a:r>
+            <a:r>
+              <a:rPr lang="en-US" dirty="0"/>
+              <a:t> </a:t>
+            </a:r>
+            <a:r>
+              <a:rPr lang="en-US" dirty="0" err="1"/>
+              <a:t>edgs</a:t>
+            </a:r>
+            <a:r>
+              <a:rPr lang="en-US" dirty="0"/>
+              <a:t> scenarios modelling</a:t>
+            </a:r>
           </a:p>
         </p:txBody>
       </p:sp>
@@ -5877,7 +6129,7 @@
         </p:blipFill>
         <p:spPr>
           <a:xfrm>
-            <a:off x="2550428" y="589358"/>
+            <a:off x="2833232" y="1690688"/>
             <a:ext cx="6525536" cy="5830114"/>
           </a:xfrm>
           <a:prstGeom prst="rect">

</xml_diff>